<commit_message>
Actualización PPT Informe Ejecutivo
</commit_message>
<xml_diff>
--- a/trabajos.inacap.2019/Preparacion y evaluacion de proyecto (PEP)/Visión artificial para el control vehicular .pptx
+++ b/trabajos.inacap.2019/Preparacion y evaluacion de proyecto (PEP)/Visión artificial para el control vehicular .pptx
@@ -6,7 +6,7 @@
     <p:sldMasterId id="2147483662" r:id="rId5"/>
   </p:sldMasterIdLst>
   <p:notesMasterIdLst>
-    <p:notesMasterId r:id="rId18"/>
+    <p:notesMasterId r:id="rId19"/>
   </p:notesMasterIdLst>
   <p:sldIdLst>
     <p:sldId id="256" r:id="rId6"/>
@@ -20,12 +20,13 @@
     <p:sldId id="265" r:id="rId14"/>
     <p:sldId id="269" r:id="rId15"/>
     <p:sldId id="266" r:id="rId16"/>
-    <p:sldId id="273" r:id="rId17"/>
+    <p:sldId id="274" r:id="rId17"/>
+    <p:sldId id="273" r:id="rId18"/>
   </p:sldIdLst>
   <p:sldSz cx="9144000" cy="6858000" type="screen4x3"/>
   <p:notesSz cx="6858000" cy="9144000"/>
   <p:custDataLst>
-    <p:tags r:id="rId19"/>
+    <p:tags r:id="rId20"/>
   </p:custDataLst>
   <p:defaultTextStyle>
     <a:defPPr>
@@ -143,9 +144,7 @@
 
 <file path=ppt/commentAuthors.xml><?xml version="1.0" encoding="utf-8"?>
 <p:cmAuthorLst xmlns:a="http://schemas.openxmlformats.org/drawingml/2006/main" xmlns:r="http://schemas.openxmlformats.org/officeDocument/2006/relationships" xmlns:p="http://schemas.openxmlformats.org/presentationml/2006/main">
-  <p:cmAuthor id="1" name="Jescica Puschel Oyaneder" initials="JPO" lastIdx="2" clrIdx="0">
-    <p:extLst/>
-  </p:cmAuthor>
+  <p:cmAuthor id="1" name="Jescica Puschel Oyaneder" initials="JPO" lastIdx="2" clrIdx="0"/>
   <p:cmAuthor id="2" name="Brenda Aguilar Bastías" initials="BAB" lastIdx="1" clrIdx="1">
     <p:extLst>
       <p:ext uri="{19B8F6BF-5375-455C-9EA6-DF929625EA0E}">
@@ -238,7 +237,7 @@
           <a:p>
             <a:fld id="{DC9DEB02-3FA3-45CA-A207-F6B27ABB3F2A}" type="datetimeFigureOut">
               <a:rPr lang="es-CL" smtClean="0"/>
-              <a:t>10-07-2019</a:t>
+              <a:t>11-07-2019</a:t>
             </a:fld>
             <a:endParaRPr lang="es-CL"/>
           </a:p>
@@ -739,7 +738,7 @@
           <a:p>
             <a:fld id="{31524595-A612-427C-89B0-BCF49485A725}" type="slidenum">
               <a:rPr lang="es-CL" smtClean="0"/>
-              <a:t>12</a:t>
+              <a:t>13</a:t>
             </a:fld>
             <a:endParaRPr lang="es-CL"/>
           </a:p>
@@ -7752,27 +7751,18 @@
       </p:sp>
       <p:pic>
         <p:nvPicPr>
-          <p:cNvPr id="5122" name="Picture 2" descr="Related image">
+          <p:cNvPr id="7" name="Imagen 6">
             <a:extLst>
               <a:ext uri="{FF2B5EF4-FFF2-40B4-BE49-F238E27FC236}">
-                <a16:creationId xmlns:a16="http://schemas.microsoft.com/office/drawing/2014/main" id="{805DD3C0-9425-46CE-A0C3-FCD33998CC9A}"/>
+                <a16:creationId xmlns:a16="http://schemas.microsoft.com/office/drawing/2014/main" id="{97C4B17D-7CA9-4C08-BFA9-8F78FFE6A28B}"/>
               </a:ext>
             </a:extLst>
           </p:cNvPr>
-          <p:cNvPicPr>
-            <a:picLocks noChangeAspect="1" noChangeArrowheads="1"/>
-          </p:cNvPicPr>
+          <p:cNvPicPr/>
           <p:nvPr/>
         </p:nvPicPr>
         <p:blipFill>
           <a:blip r:embed="rId2">
-            <a:duotone>
-              <a:schemeClr val="accent1">
-                <a:shade val="45000"/>
-                <a:satMod val="135000"/>
-              </a:schemeClr>
-              <a:prstClr val="white"/>
-            </a:duotone>
             <a:extLst>
               <a:ext uri="{28A0092B-C50C-407E-A947-70E740481C1C}">
                 <a14:useLocalDpi xmlns:a14="http://schemas.microsoft.com/office/drawing/2010/main" val="0"/>
@@ -7786,22 +7776,13 @@
         </p:blipFill>
         <p:spPr bwMode="auto">
           <a:xfrm>
-            <a:off x="1213282" y="1497368"/>
-            <a:ext cx="6162261" cy="3863264"/>
+            <a:off x="219598" y="916885"/>
+            <a:ext cx="8712368" cy="5375966"/>
           </a:xfrm>
           <a:prstGeom prst="rect">
             <a:avLst/>
           </a:prstGeom>
           <a:noFill/>
-          <a:extLst>
-            <a:ext uri="{909E8E84-426E-40DD-AFC4-6F175D3DCCD1}">
-              <a14:hiddenFill xmlns:a14="http://schemas.microsoft.com/office/drawing/2010/main">
-                <a:solidFill>
-                  <a:srgbClr val="FFFFFF"/>
-                </a:solidFill>
-              </a14:hiddenFill>
-            </a:ext>
-          </a:extLst>
         </p:spPr>
       </p:pic>
     </p:spTree>
@@ -7841,6 +7822,232 @@
             <a:spLocks noGrp="1"/>
           </p:cNvSpPr>
           <p:nvPr>
+            <p:ph type="title"/>
+          </p:nvPr>
+        </p:nvSpPr>
+        <p:spPr>
+          <a:xfrm>
+            <a:off x="259354" y="385487"/>
+            <a:ext cx="4035059" cy="436746"/>
+          </a:xfrm>
+        </p:spPr>
+        <p:txBody>
+          <a:bodyPr/>
+          <a:lstStyle/>
+          <a:p>
+            <a:r>
+              <a:rPr lang="es-CL" sz="2400" b="1" dirty="0">
+                <a:solidFill>
+                  <a:srgbClr val="E30513"/>
+                </a:solidFill>
+                <a:latin typeface="+mn-lt"/>
+              </a:rPr>
+              <a:t>Factibilidad Económica</a:t>
+            </a:r>
+          </a:p>
+        </p:txBody>
+      </p:sp>
+      <p:sp>
+        <p:nvSpPr>
+          <p:cNvPr id="3" name="Marcador de número de diapositiva 2"/>
+          <p:cNvSpPr>
+            <a:spLocks noGrp="1"/>
+          </p:cNvSpPr>
+          <p:nvPr>
+            <p:ph type="sldNum" sz="quarter" idx="12"/>
+          </p:nvPr>
+        </p:nvSpPr>
+        <p:spPr/>
+        <p:txBody>
+          <a:bodyPr/>
+          <a:lstStyle/>
+          <a:p>
+            <a:fld id="{C0F9E0D3-51B3-8D47-9FA0-6C6BA96BAD74}" type="slidenum">
+              <a:rPr lang="es-ES" smtClean="0"/>
+              <a:t>12</a:t>
+            </a:fld>
+            <a:endParaRPr lang="es-ES"/>
+          </a:p>
+        </p:txBody>
+      </p:sp>
+      <p:sp>
+        <p:nvSpPr>
+          <p:cNvPr id="6" name="Marcador de pie de página 3">
+            <a:extLst>
+              <a:ext uri="{FF2B5EF4-FFF2-40B4-BE49-F238E27FC236}">
+                <a16:creationId xmlns:a16="http://schemas.microsoft.com/office/drawing/2014/main" id="{251EB1A6-AEC5-43FE-AF85-BEA932E7637C}"/>
+              </a:ext>
+            </a:extLst>
+          </p:cNvPr>
+          <p:cNvSpPr>
+            <a:spLocks noGrp="1"/>
+          </p:cNvSpPr>
+          <p:nvPr>
+            <p:ph type="ftr" sz="quarter" idx="11"/>
+          </p:nvPr>
+        </p:nvSpPr>
+        <p:spPr>
+          <a:xfrm>
+            <a:off x="1470991" y="6292851"/>
+            <a:ext cx="6162261" cy="215900"/>
+          </a:xfrm>
+        </p:spPr>
+        <p:txBody>
+          <a:bodyPr/>
+          <a:lstStyle/>
+          <a:p>
+            <a:r>
+              <a:rPr lang="es-ES" dirty="0"/>
+              <a:t>Felipe Inda – Yerko Fuentes</a:t>
+            </a:r>
+          </a:p>
+        </p:txBody>
+      </p:sp>
+      <p:pic>
+        <p:nvPicPr>
+          <p:cNvPr id="8" name="Imagen 7">
+            <a:extLst>
+              <a:ext uri="{FF2B5EF4-FFF2-40B4-BE49-F238E27FC236}">
+                <a16:creationId xmlns:a16="http://schemas.microsoft.com/office/drawing/2014/main" id="{26DCD94A-43B1-4A80-B00C-46F3E853B25F}"/>
+              </a:ext>
+            </a:extLst>
+          </p:cNvPr>
+          <p:cNvPicPr/>
+          <p:nvPr/>
+        </p:nvPicPr>
+        <p:blipFill>
+          <a:blip r:embed="rId2">
+            <a:extLst>
+              <a:ext uri="{28A0092B-C50C-407E-A947-70E740481C1C}">
+                <a14:useLocalDpi xmlns:a14="http://schemas.microsoft.com/office/drawing/2010/main" val="0"/>
+              </a:ext>
+            </a:extLst>
+          </a:blip>
+          <a:srcRect/>
+          <a:stretch>
+            <a:fillRect/>
+          </a:stretch>
+        </p:blipFill>
+        <p:spPr bwMode="auto">
+          <a:xfrm>
+            <a:off x="259354" y="822233"/>
+            <a:ext cx="8625292" cy="1748689"/>
+          </a:xfrm>
+          <a:prstGeom prst="rect">
+            <a:avLst/>
+          </a:prstGeom>
+          <a:noFill/>
+        </p:spPr>
+      </p:pic>
+      <p:pic>
+        <p:nvPicPr>
+          <p:cNvPr id="9" name="Imagen 8">
+            <a:extLst>
+              <a:ext uri="{FF2B5EF4-FFF2-40B4-BE49-F238E27FC236}">
+                <a16:creationId xmlns:a16="http://schemas.microsoft.com/office/drawing/2014/main" id="{BE3CD47B-ACDD-4D0A-8426-D27E9B3D7173}"/>
+              </a:ext>
+            </a:extLst>
+          </p:cNvPr>
+          <p:cNvPicPr/>
+          <p:nvPr/>
+        </p:nvPicPr>
+        <p:blipFill>
+          <a:blip r:embed="rId2">
+            <a:extLst>
+              <a:ext uri="{28A0092B-C50C-407E-A947-70E740481C1C}">
+                <a14:useLocalDpi xmlns:a14="http://schemas.microsoft.com/office/drawing/2010/main" val="0"/>
+              </a:ext>
+            </a:extLst>
+          </a:blip>
+          <a:srcRect/>
+          <a:stretch>
+            <a:fillRect/>
+          </a:stretch>
+        </p:blipFill>
+        <p:spPr bwMode="auto">
+          <a:xfrm>
+            <a:off x="259354" y="2950611"/>
+            <a:ext cx="8625292" cy="1748689"/>
+          </a:xfrm>
+          <a:prstGeom prst="rect">
+            <a:avLst/>
+          </a:prstGeom>
+          <a:noFill/>
+        </p:spPr>
+      </p:pic>
+      <p:pic>
+        <p:nvPicPr>
+          <p:cNvPr id="10" name="Imagen 9">
+            <a:extLst>
+              <a:ext uri="{FF2B5EF4-FFF2-40B4-BE49-F238E27FC236}">
+                <a16:creationId xmlns:a16="http://schemas.microsoft.com/office/drawing/2014/main" id="{202F5A0A-FBCC-4D3B-B47D-8B470A9374DF}"/>
+              </a:ext>
+            </a:extLst>
+          </p:cNvPr>
+          <p:cNvPicPr/>
+          <p:nvPr/>
+        </p:nvPicPr>
+        <p:blipFill>
+          <a:blip r:embed="rId3">
+            <a:extLst>
+              <a:ext uri="{28A0092B-C50C-407E-A947-70E740481C1C}">
+                <a14:useLocalDpi xmlns:a14="http://schemas.microsoft.com/office/drawing/2010/main" val="0"/>
+              </a:ext>
+            </a:extLst>
+          </a:blip>
+          <a:srcRect/>
+          <a:stretch>
+            <a:fillRect/>
+          </a:stretch>
+        </p:blipFill>
+        <p:spPr bwMode="auto">
+          <a:xfrm>
+            <a:off x="259353" y="5078989"/>
+            <a:ext cx="8625291" cy="1213862"/>
+          </a:xfrm>
+          <a:prstGeom prst="rect">
+            <a:avLst/>
+          </a:prstGeom>
+          <a:noFill/>
+        </p:spPr>
+      </p:pic>
+    </p:spTree>
+    <p:extLst>
+      <p:ext uri="{BB962C8B-B14F-4D97-AF65-F5344CB8AC3E}">
+        <p14:creationId xmlns:p14="http://schemas.microsoft.com/office/powerpoint/2010/main" val="3577316783"/>
+      </p:ext>
+    </p:extLst>
+  </p:cSld>
+  <p:clrMapOvr>
+    <a:masterClrMapping/>
+  </p:clrMapOvr>
+</p:sld>
+</file>
+
+<file path=ppt/slides/slide13.xml><?xml version="1.0" encoding="utf-8"?>
+<p:sld xmlns:a="http://schemas.openxmlformats.org/drawingml/2006/main" xmlns:r="http://schemas.openxmlformats.org/officeDocument/2006/relationships" xmlns:p="http://schemas.openxmlformats.org/presentationml/2006/main">
+  <p:cSld>
+    <p:spTree>
+      <p:nvGrpSpPr>
+        <p:cNvPr id="1" name=""/>
+        <p:cNvGrpSpPr/>
+        <p:nvPr/>
+      </p:nvGrpSpPr>
+      <p:grpSpPr>
+        <a:xfrm>
+          <a:off x="0" y="0"/>
+          <a:ext cx="0" cy="0"/>
+          <a:chOff x="0" y="0"/>
+          <a:chExt cx="0" cy="0"/>
+        </a:xfrm>
+      </p:grpSpPr>
+      <p:sp>
+        <p:nvSpPr>
+          <p:cNvPr id="2" name="Título 1"/>
+          <p:cNvSpPr>
+            <a:spLocks noGrp="1"/>
+          </p:cNvSpPr>
+          <p:nvPr>
             <p:ph type="ctrTitle"/>
           </p:nvPr>
         </p:nvSpPr>
@@ -9625,36 +9832,6 @@
       </p:pic>
       <p:pic>
         <p:nvPicPr>
-          <p:cNvPr id="10" name="Imagen 9">
-            <a:extLst>
-              <a:ext uri="{FF2B5EF4-FFF2-40B4-BE49-F238E27FC236}">
-                <a16:creationId xmlns:a16="http://schemas.microsoft.com/office/drawing/2014/main" id="{8A8E1D79-F0D8-4D36-B9F5-F2A85360C679}"/>
-              </a:ext>
-            </a:extLst>
-          </p:cNvPr>
-          <p:cNvPicPr>
-            <a:picLocks noChangeAspect="1"/>
-          </p:cNvPicPr>
-          <p:nvPr/>
-        </p:nvPicPr>
-        <p:blipFill>
-          <a:blip r:embed="rId3"/>
-          <a:stretch>
-            <a:fillRect/>
-          </a:stretch>
-        </p:blipFill>
-        <p:spPr>
-          <a:xfrm>
-            <a:off x="3416062" y="1468673"/>
-            <a:ext cx="4194464" cy="2359386"/>
-          </a:xfrm>
-          <a:prstGeom prst="rect">
-            <a:avLst/>
-          </a:prstGeom>
-        </p:spPr>
-      </p:pic>
-      <p:pic>
-        <p:nvPicPr>
           <p:cNvPr id="11" name="Imagen 10">
             <a:extLst>
               <a:ext uri="{FF2B5EF4-FFF2-40B4-BE49-F238E27FC236}">
@@ -9668,7 +9845,7 @@
           <p:nvPr/>
         </p:nvPicPr>
         <p:blipFill>
-          <a:blip r:embed="rId4"/>
+          <a:blip r:embed="rId3"/>
           <a:stretch>
             <a:fillRect/>
           </a:stretch>
@@ -9698,7 +9875,7 @@
           <p:nvPr/>
         </p:nvPicPr>
         <p:blipFill>
-          <a:blip r:embed="rId5">
+          <a:blip r:embed="rId4">
             <a:extLst>
               <a:ext uri="{28A0092B-C50C-407E-A947-70E740481C1C}">
                 <a14:useLocalDpi xmlns:a14="http://schemas.microsoft.com/office/drawing/2010/main" val="0"/>
@@ -9728,6 +9905,65 @@
               </a14:hiddenFill>
             </a:ext>
           </a:extLst>
+        </p:spPr>
+      </p:pic>
+      <p:pic>
+        <p:nvPicPr>
+          <p:cNvPr id="3" name="Imagen 2">
+            <a:extLst>
+              <a:ext uri="{FF2B5EF4-FFF2-40B4-BE49-F238E27FC236}">
+                <a16:creationId xmlns:a16="http://schemas.microsoft.com/office/drawing/2014/main" id="{55C6CB07-EE60-4942-8479-16009CE7C487}"/>
+              </a:ext>
+            </a:extLst>
+          </p:cNvPr>
+          <p:cNvPicPr>
+            <a:picLocks noChangeAspect="1"/>
+          </p:cNvPicPr>
+          <p:nvPr/>
+        </p:nvPicPr>
+        <p:blipFill>
+          <a:blip r:embed="rId5"/>
+          <a:stretch>
+            <a:fillRect/>
+          </a:stretch>
+        </p:blipFill>
+        <p:spPr>
+          <a:xfrm>
+            <a:off x="6433070" y="2742523"/>
+            <a:ext cx="2710930" cy="2394233"/>
+          </a:xfrm>
+          <a:prstGeom prst="rect">
+            <a:avLst/>
+          </a:prstGeom>
+        </p:spPr>
+      </p:pic>
+      <p:pic>
+        <p:nvPicPr>
+          <p:cNvPr id="10" name="Imagen 9">
+            <a:extLst>
+              <a:ext uri="{FF2B5EF4-FFF2-40B4-BE49-F238E27FC236}">
+                <a16:creationId xmlns:a16="http://schemas.microsoft.com/office/drawing/2014/main" id="{8A8E1D79-F0D8-4D36-B9F5-F2A85360C679}"/>
+              </a:ext>
+            </a:extLst>
+          </p:cNvPr>
+          <p:cNvPicPr>
+            <a:picLocks noChangeAspect="1"/>
+          </p:cNvPicPr>
+          <p:nvPr/>
+        </p:nvPicPr>
+        <p:blipFill rotWithShape="1">
+          <a:blip r:embed="rId6"/>
+          <a:srcRect l="7238" r="9567"/>
+          <a:stretch/>
+        </p:blipFill>
+        <p:spPr>
+          <a:xfrm>
+            <a:off x="3377226" y="1468673"/>
+            <a:ext cx="3489541" cy="2359386"/>
+          </a:xfrm>
+          <a:prstGeom prst="rect">
+            <a:avLst/>
+          </a:prstGeom>
         </p:spPr>
       </p:pic>
     </p:spTree>
@@ -11052,12 +11288,6 @@
 </file>
 
 <file path=customXml/item2.xml><?xml version="1.0" encoding="utf-8"?>
-<p:properties xmlns:p="http://schemas.microsoft.com/office/2006/metadata/properties" xmlns:xsi="http://www.w3.org/2001/XMLSchema-instance" xmlns:pc="http://schemas.microsoft.com/office/infopath/2007/PartnerControls">
-  <documentManagement/>
-</p:properties>
-</file>
-
-<file path=customXml/item3.xml><?xml version="1.0" encoding="utf-8"?>
 <ct:contentTypeSchema xmlns:ct="http://schemas.microsoft.com/office/2006/metadata/contentType" xmlns:ma="http://schemas.microsoft.com/office/2006/metadata/properties/metaAttributes" ct:_="" ma:_="" ma:contentTypeName="Documento" ma:contentTypeID="0x0101000F4758918AE592448477A0AA5DA5229B" ma:contentTypeVersion="0" ma:contentTypeDescription="Crear nuevo documento." ma:contentTypeScope="" ma:versionID="4712974915117db248daa0568bea06ff">
   <xsd:schema xmlns:xsd="http://www.w3.org/2001/XMLSchema" xmlns:xs="http://www.w3.org/2001/XMLSchema" xmlns:p="http://schemas.microsoft.com/office/2006/metadata/properties" targetNamespace="http://schemas.microsoft.com/office/2006/metadata/properties" ma:root="true" ma:fieldsID="3f6edc329ff236629c56e3b879b320d0">
     <xsd:element name="properties">
@@ -11171,6 +11401,12 @@
 </ct:contentTypeSchema>
 </file>
 
+<file path=customXml/item3.xml><?xml version="1.0" encoding="utf-8"?>
+<p:properties xmlns:p="http://schemas.microsoft.com/office/2006/metadata/properties" xmlns:xsi="http://www.w3.org/2001/XMLSchema-instance" xmlns:pc="http://schemas.microsoft.com/office/infopath/2007/PartnerControls">
+  <documentManagement/>
+</p:properties>
+</file>
+
 <file path=customXml/itemProps1.xml><?xml version="1.0" encoding="utf-8"?>
 <ds:datastoreItem xmlns:ds="http://schemas.openxmlformats.org/officeDocument/2006/customXml" ds:itemID="{AF2F9DA8-E6EE-4A55-B1BF-8F222A7179D9}">
   <ds:schemaRefs>
@@ -11180,15 +11416,6 @@
 </file>
 
 <file path=customXml/itemProps2.xml><?xml version="1.0" encoding="utf-8"?>
-<ds:datastoreItem xmlns:ds="http://schemas.openxmlformats.org/officeDocument/2006/customXml" ds:itemID="{17BC7EFF-F6A5-46A1-B973-BC543C86928B}">
-  <ds:schemaRefs>
-    <ds:schemaRef ds:uri="http://schemas.microsoft.com/office/2006/metadata/properties"/>
-    <ds:schemaRef ds:uri="http://schemas.microsoft.com/office/infopath/2007/PartnerControls"/>
-  </ds:schemaRefs>
-</ds:datastoreItem>
-</file>
-
-<file path=customXml/itemProps3.xml><?xml version="1.0" encoding="utf-8"?>
 <ds:datastoreItem xmlns:ds="http://schemas.openxmlformats.org/officeDocument/2006/customXml" ds:itemID="{7ACA9EC1-A498-469E-9FAB-CE090C2E0E75}">
   <ds:schemaRefs>
     <ds:schemaRef ds:uri="http://schemas.microsoft.com/office/2006/metadata/contentType"/>
@@ -11202,4 +11429,13 @@
     <ds:schemaRef ds:uri="http://schemas.microsoft.com/office/infopath/2007/PartnerControls"/>
   </ds:schemaRefs>
 </ds:datastoreItem>
+</file>
+
+<file path=customXml/itemProps3.xml><?xml version="1.0" encoding="utf-8"?>
+<ds:datastoreItem xmlns:ds="http://schemas.openxmlformats.org/officeDocument/2006/customXml" ds:itemID="{17BC7EFF-F6A5-46A1-B973-BC543C86928B}">
+  <ds:schemaRefs>
+    <ds:schemaRef ds:uri="http://schemas.microsoft.com/office/2006/metadata/properties"/>
+    <ds:schemaRef ds:uri="http://schemas.microsoft.com/office/infopath/2007/PartnerControls"/>
+  </ds:schemaRefs>
+</ds:datastoreItem>
 </file>
</xml_diff>